<commit_message>
equine cv changed 2.0
</commit_message>
<xml_diff>
--- a/CV Varvara Lazarenko PhD Aneuploidy, Veterinary Embryologist.pptx
+++ b/CV Varvara Lazarenko PhD Aneuploidy, Veterinary Embryologist.pptx
@@ -247,7 +247,7 @@
       <p15:sldGuideLst xmlns:p15="http://schemas.microsoft.com/office/powerpoint/2012/main"/>
     </p:ext>
     <p:ext uri="GoogleSlidesCustomDataVersion2">
-      <go:slidesCustomData xmlns="" xmlns:mc="http://schemas.openxmlformats.org/markup-compatibility/2006" xmlns:mv="urn:schemas-microsoft-com:mac:vml" xmlns:c="http://schemas.openxmlformats.org/drawingml/2006/chart" xmlns:dgm="http://schemas.openxmlformats.org/drawingml/2006/diagram" xmlns:o="urn:schemas-microsoft-com:office:office" xmlns:v="urn:schemas-microsoft-com:vml" xmlns:pvml="urn:schemas-microsoft-com:office:powerpoint" xmlns:com="http://schemas.openxmlformats.org/drawingml/2006/compatibility" xmlns:p14="http://schemas.microsoft.com/office/powerpoint/2010/main" xmlns:p15="http://schemas.microsoft.com/office/powerpoint/2012/main" xmlns:ahyp="http://schemas.microsoft.com/office/drawing/2018/hyperlinkcolor" xmlns:go="http://customooxmlschemas.google.com/" r:id="rId23" roundtripDataSignature="AMtx7mjeLRqlypDdHeyNK1HuUcu/GrX6Sg=="/>
+      <go:slidesCustomData xmlns:go="http://customooxmlschemas.google.com/" xmlns:ahyp="http://schemas.microsoft.com/office/drawing/2018/hyperlinkcolor" xmlns:p15="http://schemas.microsoft.com/office/powerpoint/2012/main" xmlns:p14="http://schemas.microsoft.com/office/powerpoint/2010/main" xmlns:com="http://schemas.openxmlformats.org/drawingml/2006/compatibility" xmlns:pvml="urn:schemas-microsoft-com:office:powerpoint" xmlns:v="urn:schemas-microsoft-com:vml" xmlns:o="urn:schemas-microsoft-com:office:office" xmlns:dgm="http://schemas.openxmlformats.org/drawingml/2006/diagram" xmlns:c="http://schemas.openxmlformats.org/drawingml/2006/chart" xmlns:mv="urn:schemas-microsoft-com:mac:vml" xmlns:mc="http://schemas.openxmlformats.org/markup-compatibility/2006" xmlns="" r:id="rId23" roundtripDataSignature="AMtx7mjeLRqlypDdHeyNK1HuUcu/GrX6Sg=="/>
     </p:ext>
   </p:extLst>
 </p:presentation>
@@ -16847,7 +16847,7 @@
                 <a:cs typeface="Verdana"/>
                 <a:sym typeface="Verdana"/>
               </a:rPr>
-              <a:t>GPA: </a:t>
+              <a:t>GPA result: </a:t>
             </a:r>
             <a:r>
               <a:rPr lang="en-US" sz="1000" b="1" dirty="0">

</xml_diff>

<commit_message>
equine cv changed 3.0
</commit_message>
<xml_diff>
--- a/CV Varvara Lazarenko PhD Aneuploidy, Veterinary Embryologist.pptx
+++ b/CV Varvara Lazarenko PhD Aneuploidy, Veterinary Embryologist.pptx
@@ -247,7 +247,7 @@
       <p15:sldGuideLst xmlns:p15="http://schemas.microsoft.com/office/powerpoint/2012/main"/>
     </p:ext>
     <p:ext uri="GoogleSlidesCustomDataVersion2">
-      <go:slidesCustomData xmlns:go="http://customooxmlschemas.google.com/" xmlns:ahyp="http://schemas.microsoft.com/office/drawing/2018/hyperlinkcolor" xmlns:p15="http://schemas.microsoft.com/office/powerpoint/2012/main" xmlns:p14="http://schemas.microsoft.com/office/powerpoint/2010/main" xmlns:com="http://schemas.openxmlformats.org/drawingml/2006/compatibility" xmlns:pvml="urn:schemas-microsoft-com:office:powerpoint" xmlns:v="urn:schemas-microsoft-com:vml" xmlns:o="urn:schemas-microsoft-com:office:office" xmlns:dgm="http://schemas.openxmlformats.org/drawingml/2006/diagram" xmlns:c="http://schemas.openxmlformats.org/drawingml/2006/chart" xmlns:mv="urn:schemas-microsoft-com:mac:vml" xmlns:mc="http://schemas.openxmlformats.org/markup-compatibility/2006" xmlns="" r:id="rId23" roundtripDataSignature="AMtx7mjeLRqlypDdHeyNK1HuUcu/GrX6Sg=="/>
+      <go:slidesCustomData xmlns="" xmlns:mc="http://schemas.openxmlformats.org/markup-compatibility/2006" xmlns:mv="urn:schemas-microsoft-com:mac:vml" xmlns:c="http://schemas.openxmlformats.org/drawingml/2006/chart" xmlns:dgm="http://schemas.openxmlformats.org/drawingml/2006/diagram" xmlns:o="urn:schemas-microsoft-com:office:office" xmlns:v="urn:schemas-microsoft-com:vml" xmlns:pvml="urn:schemas-microsoft-com:office:powerpoint" xmlns:com="http://schemas.openxmlformats.org/drawingml/2006/compatibility" xmlns:p14="http://schemas.microsoft.com/office/powerpoint/2010/main" xmlns:p15="http://schemas.microsoft.com/office/powerpoint/2012/main" xmlns:ahyp="http://schemas.microsoft.com/office/drawing/2018/hyperlinkcolor" xmlns:go="http://customooxmlschemas.google.com/" r:id="rId23" roundtripDataSignature="AMtx7mjeLRqlypDdHeyNK1HuUcu/GrX6Sg=="/>
     </p:ext>
   </p:extLst>
 </p:presentation>
@@ -16406,8 +16406,8 @@
         </p:nvSpPr>
         <p:spPr>
           <a:xfrm flipH="1">
-            <a:off x="1531033" y="2518847"/>
-            <a:ext cx="6001849" cy="3905571"/>
+            <a:off x="1436024" y="2518847"/>
+            <a:ext cx="6086988" cy="3831705"/>
           </a:xfrm>
           <a:prstGeom prst="rect">
             <a:avLst/>
@@ -16945,7 +16945,7 @@
                 <a:latin typeface="Verdana" panose="020B0604030504040204" pitchFamily="34" charset="0"/>
                 <a:ea typeface="Verdana" panose="020B0604030504040204" pitchFamily="34" charset="0"/>
               </a:rPr>
-              <a:t>: PCR, gel electrophoresis, wire myography, western blotting, ELISA, immunohistochemistry, intracellular recording (microelectrodes, patch clamp), behaviour testing (open field test, elevated plus maze, light-dark box test)</a:t>
+              <a:t>: PCR, qPCR, RT-PCR, gel electrophoresis, wire myography, western blotting, ELISA, microscopy, cell culture, immunohistochemistry, intracellular recording (microelectrodes, patch clamp), behaviour tests (open field test, elevated plus maze, light-dark box test)</a:t>
             </a:r>
           </a:p>
           <a:p>
@@ -17132,7 +17132,7 @@
         </p:nvSpPr>
         <p:spPr>
           <a:xfrm flipH="1">
-            <a:off x="101116" y="2518852"/>
+            <a:off x="59550" y="2518852"/>
             <a:ext cx="1477500" cy="212400"/>
           </a:xfrm>
           <a:prstGeom prst="rect">
@@ -17211,7 +17211,7 @@
         </p:nvSpPr>
         <p:spPr>
           <a:xfrm flipH="1">
-            <a:off x="101131" y="4179092"/>
+            <a:off x="59565" y="4179092"/>
             <a:ext cx="1456696" cy="212400"/>
           </a:xfrm>
           <a:prstGeom prst="rect">
@@ -17413,7 +17413,7 @@
                 <a:cs typeface="Verdana"/>
                 <a:sym typeface="Verdana"/>
               </a:rPr>
-              <a:t>I am a curious and dedicated graduate with a Master’s degree in Medical Biology, driven by a genuine passion for advancing healthcare through science. My experience spans both fundamental research and clinical trial development. With a solid biomedical background and a love for sharing knowledge, I am motivated to contribute to meaningful research that supports the health and well-being of both people and animals.</a:t>
+              <a:t>I am a curious and dedicated graduate with a Master’s degree in Medical Biology, driven by a genuine passion for advancing healthcare through science. My experience spans both fundamental research and clinical trial development. With a solid biomedical background and a keen interest for sharing knowledge, I am motivated to do meaningful research to support the health and well-being of both people and animals.</a:t>
             </a:r>
             <a:endParaRPr lang="en-GB" sz="900" dirty="0"/>
           </a:p>

</xml_diff>